<commit_message>
added SVR ML model to Coreys notebook folder
</commit_message>
<xml_diff>
--- a/Presentation.pptx
+++ b/Presentation.pptx
@@ -9,6 +9,7 @@
     <p:sldId id="258" r:id="rId3"/>
     <p:sldId id="259" r:id="rId4"/>
     <p:sldId id="260" r:id="rId5"/>
+    <p:sldId id="261" r:id="rId6"/>
   </p:sldIdLst>
   <p:sldSz cx="12192000" cy="6858000"/>
   <p:notesSz cx="6858000" cy="9144000"/>
@@ -107,7 +108,57 @@
       </a:defRPr>
     </a:lvl9pPr>
   </p:defaultTextStyle>
+  <p:extLst>
+    <p:ext uri="{EFAFB233-063F-42B5-8137-9DF3F51BA10A}">
+      <p15:sldGuideLst xmlns:p15="http://schemas.microsoft.com/office/powerpoint/2012/main"/>
+    </p:ext>
+  </p:extLst>
 </p:presentation>
+</file>
+
+<file path=ppt/changesInfos/changesInfo1.xml><?xml version="1.0" encoding="utf-8"?>
+<pc:chgInfo xmlns:a="http://schemas.openxmlformats.org/drawingml/2006/main" xmlns:r="http://schemas.openxmlformats.org/officeDocument/2006/relationships" xmlns:ac="http://schemas.microsoft.com/office/drawing/2013/main/command" xmlns:pc="http://schemas.microsoft.com/office/powerpoint/2013/main/command">
+  <pc:docChgLst>
+    <pc:chgData name="Corey Holton" userId="dfccdeabb580c92e" providerId="LiveId" clId="{644700FA-CD20-461E-AF5B-A3FFF87215D1}"/>
+    <pc:docChg chg="addSld modSld">
+      <pc:chgData name="Corey Holton" userId="dfccdeabb580c92e" providerId="LiveId" clId="{644700FA-CD20-461E-AF5B-A3FFF87215D1}" dt="2024-10-23T02:18:05.569" v="54" actId="20577"/>
+      <pc:docMkLst>
+        <pc:docMk/>
+      </pc:docMkLst>
+      <pc:sldChg chg="addSp delSp modSp new mod">
+        <pc:chgData name="Corey Holton" userId="dfccdeabb580c92e" providerId="LiveId" clId="{644700FA-CD20-461E-AF5B-A3FFF87215D1}" dt="2024-10-23T02:18:05.569" v="54" actId="20577"/>
+        <pc:sldMkLst>
+          <pc:docMk/>
+          <pc:sldMk cId="3060779616" sldId="261"/>
+        </pc:sldMkLst>
+        <pc:spChg chg="mod">
+          <ac:chgData name="Corey Holton" userId="dfccdeabb580c92e" providerId="LiveId" clId="{644700FA-CD20-461E-AF5B-A3FFF87215D1}" dt="2024-10-23T02:18:05.569" v="54" actId="20577"/>
+          <ac:spMkLst>
+            <pc:docMk/>
+            <pc:sldMk cId="3060779616" sldId="261"/>
+            <ac:spMk id="2" creationId="{AD02D3ED-D3BA-D322-C15A-C77491B45F81}"/>
+          </ac:spMkLst>
+        </pc:spChg>
+        <pc:spChg chg="del">
+          <ac:chgData name="Corey Holton" userId="dfccdeabb580c92e" providerId="LiveId" clId="{644700FA-CD20-461E-AF5B-A3FFF87215D1}" dt="2024-10-23T02:16:20.021" v="1" actId="22"/>
+          <ac:spMkLst>
+            <pc:docMk/>
+            <pc:sldMk cId="3060779616" sldId="261"/>
+            <ac:spMk id="3" creationId="{32DDCA19-6C17-45EE-C3E5-C36448BDD941}"/>
+          </ac:spMkLst>
+        </pc:spChg>
+        <pc:picChg chg="add mod ord">
+          <ac:chgData name="Corey Holton" userId="dfccdeabb580c92e" providerId="LiveId" clId="{644700FA-CD20-461E-AF5B-A3FFF87215D1}" dt="2024-10-23T02:16:20.021" v="1" actId="22"/>
+          <ac:picMkLst>
+            <pc:docMk/>
+            <pc:sldMk cId="3060779616" sldId="261"/>
+            <ac:picMk id="5" creationId="{BBC45A0C-6BB4-73A3-0A28-8CA4CF20E99F}"/>
+          </ac:picMkLst>
+        </pc:picChg>
+      </pc:sldChg>
+    </pc:docChg>
+  </pc:docChgLst>
+</pc:chgInfo>
 </file>
 
 <file path=ppt/slideLayouts/slideLayout1.xml><?xml version="1.0" encoding="utf-8"?>
@@ -257,7 +308,7 @@
           <a:p>
             <a:fld id="{A39D7663-49E6-464A-B1B5-D4B6E2340CA0}" type="datetimeFigureOut">
               <a:rPr lang="en-US" smtClean="0"/>
-              <a:t>10/21/2024</a:t>
+              <a:t>10/22/2024</a:t>
             </a:fld>
             <a:endParaRPr lang="en-US"/>
           </a:p>
@@ -455,7 +506,7 @@
           <a:p>
             <a:fld id="{A39D7663-49E6-464A-B1B5-D4B6E2340CA0}" type="datetimeFigureOut">
               <a:rPr lang="en-US" smtClean="0"/>
-              <a:t>10/21/2024</a:t>
+              <a:t>10/22/2024</a:t>
             </a:fld>
             <a:endParaRPr lang="en-US"/>
           </a:p>
@@ -663,7 +714,7 @@
           <a:p>
             <a:fld id="{A39D7663-49E6-464A-B1B5-D4B6E2340CA0}" type="datetimeFigureOut">
               <a:rPr lang="en-US" smtClean="0"/>
-              <a:t>10/21/2024</a:t>
+              <a:t>10/22/2024</a:t>
             </a:fld>
             <a:endParaRPr lang="en-US"/>
           </a:p>
@@ -861,7 +912,7 @@
           <a:p>
             <a:fld id="{A39D7663-49E6-464A-B1B5-D4B6E2340CA0}" type="datetimeFigureOut">
               <a:rPr lang="en-US" smtClean="0"/>
-              <a:t>10/21/2024</a:t>
+              <a:t>10/22/2024</a:t>
             </a:fld>
             <a:endParaRPr lang="en-US"/>
           </a:p>
@@ -1136,7 +1187,7 @@
           <a:p>
             <a:fld id="{A39D7663-49E6-464A-B1B5-D4B6E2340CA0}" type="datetimeFigureOut">
               <a:rPr lang="en-US" smtClean="0"/>
-              <a:t>10/21/2024</a:t>
+              <a:t>10/22/2024</a:t>
             </a:fld>
             <a:endParaRPr lang="en-US"/>
           </a:p>
@@ -1401,7 +1452,7 @@
           <a:p>
             <a:fld id="{A39D7663-49E6-464A-B1B5-D4B6E2340CA0}" type="datetimeFigureOut">
               <a:rPr lang="en-US" smtClean="0"/>
-              <a:t>10/21/2024</a:t>
+              <a:t>10/22/2024</a:t>
             </a:fld>
             <a:endParaRPr lang="en-US"/>
           </a:p>
@@ -1813,7 +1864,7 @@
           <a:p>
             <a:fld id="{A39D7663-49E6-464A-B1B5-D4B6E2340CA0}" type="datetimeFigureOut">
               <a:rPr lang="en-US" smtClean="0"/>
-              <a:t>10/21/2024</a:t>
+              <a:t>10/22/2024</a:t>
             </a:fld>
             <a:endParaRPr lang="en-US"/>
           </a:p>
@@ -1954,7 +2005,7 @@
           <a:p>
             <a:fld id="{A39D7663-49E6-464A-B1B5-D4B6E2340CA0}" type="datetimeFigureOut">
               <a:rPr lang="en-US" smtClean="0"/>
-              <a:t>10/21/2024</a:t>
+              <a:t>10/22/2024</a:t>
             </a:fld>
             <a:endParaRPr lang="en-US"/>
           </a:p>
@@ -2067,7 +2118,7 @@
           <a:p>
             <a:fld id="{A39D7663-49E6-464A-B1B5-D4B6E2340CA0}" type="datetimeFigureOut">
               <a:rPr lang="en-US" smtClean="0"/>
-              <a:t>10/21/2024</a:t>
+              <a:t>10/22/2024</a:t>
             </a:fld>
             <a:endParaRPr lang="en-US"/>
           </a:p>
@@ -2378,7 +2429,7 @@
           <a:p>
             <a:fld id="{A39D7663-49E6-464A-B1B5-D4B6E2340CA0}" type="datetimeFigureOut">
               <a:rPr lang="en-US" smtClean="0"/>
-              <a:t>10/21/2024</a:t>
+              <a:t>10/22/2024</a:t>
             </a:fld>
             <a:endParaRPr lang="en-US"/>
           </a:p>
@@ -2666,7 +2717,7 @@
           <a:p>
             <a:fld id="{A39D7663-49E6-464A-B1B5-D4B6E2340CA0}" type="datetimeFigureOut">
               <a:rPr lang="en-US" smtClean="0"/>
-              <a:t>10/21/2024</a:t>
+              <a:t>10/22/2024</a:t>
             </a:fld>
             <a:endParaRPr lang="en-US"/>
           </a:p>
@@ -2907,7 +2958,7 @@
           <a:p>
             <a:fld id="{A39D7663-49E6-464A-B1B5-D4B6E2340CA0}" type="datetimeFigureOut">
               <a:rPr lang="en-US" smtClean="0"/>
-              <a:t>10/21/2024</a:t>
+              <a:t>10/22/2024</a:t>
             </a:fld>
             <a:endParaRPr lang="en-US"/>
           </a:p>
@@ -3957,6 +4008,93 @@
     <p:extLst>
       <p:ext uri="{BB962C8B-B14F-4D97-AF65-F5344CB8AC3E}">
         <p14:creationId xmlns:p14="http://schemas.microsoft.com/office/powerpoint/2010/main" val="1459016155"/>
+      </p:ext>
+    </p:extLst>
+  </p:cSld>
+  <p:clrMapOvr>
+    <a:masterClrMapping/>
+  </p:clrMapOvr>
+</p:sld>
+</file>
+
+<file path=ppt/slides/slide5.xml><?xml version="1.0" encoding="utf-8"?>
+<p:sld xmlns:a="http://schemas.openxmlformats.org/drawingml/2006/main" xmlns:r="http://schemas.openxmlformats.org/officeDocument/2006/relationships" xmlns:p="http://schemas.openxmlformats.org/presentationml/2006/main">
+  <p:cSld>
+    <p:spTree>
+      <p:nvGrpSpPr>
+        <p:cNvPr id="1" name=""/>
+        <p:cNvGrpSpPr/>
+        <p:nvPr/>
+      </p:nvGrpSpPr>
+      <p:grpSpPr>
+        <a:xfrm>
+          <a:off x="0" y="0"/>
+          <a:ext cx="0" cy="0"/>
+          <a:chOff x="0" y="0"/>
+          <a:chExt cx="0" cy="0"/>
+        </a:xfrm>
+      </p:grpSpPr>
+      <p:sp>
+        <p:nvSpPr>
+          <p:cNvPr id="2" name="Title 1">
+            <a:extLst>
+              <a:ext uri="{FF2B5EF4-FFF2-40B4-BE49-F238E27FC236}">
+                <a16:creationId xmlns:a16="http://schemas.microsoft.com/office/drawing/2014/main" id="{AD02D3ED-D3BA-D322-C15A-C77491B45F81}"/>
+              </a:ext>
+            </a:extLst>
+          </p:cNvPr>
+          <p:cNvSpPr>
+            <a:spLocks noGrp="1"/>
+          </p:cNvSpPr>
+          <p:nvPr>
+            <p:ph type="title"/>
+          </p:nvPr>
+        </p:nvSpPr>
+        <p:spPr/>
+        <p:txBody>
+          <a:bodyPr/>
+          <a:lstStyle/>
+          <a:p>
+            <a:r>
+              <a:rPr lang="en-US" dirty="0"/>
+              <a:t>Data cleaning and DB checking</a:t>
+            </a:r>
+          </a:p>
+        </p:txBody>
+      </p:sp>
+      <p:pic>
+        <p:nvPicPr>
+          <p:cNvPr id="5" name="Content Placeholder 4">
+            <a:extLst>
+              <a:ext uri="{FF2B5EF4-FFF2-40B4-BE49-F238E27FC236}">
+                <a16:creationId xmlns:a16="http://schemas.microsoft.com/office/drawing/2014/main" id="{BBC45A0C-6BB4-73A3-0A28-8CA4CF20E99F}"/>
+              </a:ext>
+            </a:extLst>
+          </p:cNvPr>
+          <p:cNvPicPr>
+            <a:picLocks noGrp="1" noChangeAspect="1"/>
+          </p:cNvPicPr>
+          <p:nvPr>
+            <p:ph idx="1"/>
+          </p:nvPr>
+        </p:nvPicPr>
+        <p:blipFill>
+          <a:blip r:embed="rId2"/>
+          <a:stretch>
+            <a:fillRect/>
+          </a:stretch>
+        </p:blipFill>
+        <p:spPr>
+          <a:xfrm>
+            <a:off x="1212254" y="1825625"/>
+            <a:ext cx="9767492" cy="4351338"/>
+          </a:xfrm>
+        </p:spPr>
+      </p:pic>
+    </p:spTree>
+    <p:extLst>
+      <p:ext uri="{BB962C8B-B14F-4D97-AF65-F5344CB8AC3E}">
+        <p14:creationId xmlns:p14="http://schemas.microsoft.com/office/powerpoint/2010/main" val="3060779616"/>
       </p:ext>
     </p:extLst>
   </p:cSld>

</xml_diff>

<commit_message>
added slide with KNN to ppt, created a few new notebooks with different models
</commit_message>
<xml_diff>
--- a/Presentation.pptx
+++ b/Presentation.pptx
@@ -10,6 +10,8 @@
     <p:sldId id="259" r:id="rId4"/>
     <p:sldId id="260" r:id="rId5"/>
     <p:sldId id="261" r:id="rId6"/>
+    <p:sldId id="263" r:id="rId7"/>
+    <p:sldId id="262" r:id="rId8"/>
   </p:sldIdLst>
   <p:sldSz cx="12192000" cy="6858000"/>
   <p:notesSz cx="6858000" cy="9144000"/>
@@ -116,12 +118,20 @@
 </p:presentation>
 </file>
 
+<file path=ppt/revisionInfo.xml><?xml version="1.0" encoding="utf-8"?>
+<p1510:revInfo xmlns:a="http://schemas.openxmlformats.org/drawingml/2006/main" xmlns:r="http://schemas.openxmlformats.org/officeDocument/2006/relationships" xmlns:p1510="http://schemas.microsoft.com/office/powerpoint/2015/10/main">
+  <p1510:revLst>
+    <p1510:client id="{5BDD9720-0376-4A4B-95A2-4FD6DC09E18D}" v="5" dt="2024-10-24T04:22:20.268"/>
+  </p1510:revLst>
+</p1510:revInfo>
+</file>
+
 <file path=ppt/changesInfos/changesInfo1.xml><?xml version="1.0" encoding="utf-8"?>
 <pc:chgInfo xmlns:a="http://schemas.openxmlformats.org/drawingml/2006/main" xmlns:r="http://schemas.openxmlformats.org/officeDocument/2006/relationships" xmlns:ac="http://schemas.microsoft.com/office/drawing/2013/main/command" xmlns:pc="http://schemas.microsoft.com/office/powerpoint/2013/main/command">
   <pc:docChgLst>
     <pc:chgData name="Corey Holton" userId="dfccdeabb580c92e" providerId="LiveId" clId="{644700FA-CD20-461E-AF5B-A3FFF87215D1}"/>
     <pc:docChg chg="addSld modSld">
-      <pc:chgData name="Corey Holton" userId="dfccdeabb580c92e" providerId="LiveId" clId="{644700FA-CD20-461E-AF5B-A3FFF87215D1}" dt="2024-10-23T02:18:05.569" v="54" actId="20577"/>
+      <pc:chgData name="Corey Holton" userId="dfccdeabb580c92e" providerId="LiveId" clId="{644700FA-CD20-461E-AF5B-A3FFF87215D1}" dt="2024-10-24T14:30:25.742" v="87" actId="20577"/>
       <pc:docMkLst>
         <pc:docMk/>
       </pc:docMkLst>
@@ -156,6 +166,69 @@
           </ac:picMkLst>
         </pc:picChg>
       </pc:sldChg>
+      <pc:sldChg chg="addSp delSp modSp new mod">
+        <pc:chgData name="Corey Holton" userId="dfccdeabb580c92e" providerId="LiveId" clId="{644700FA-CD20-461E-AF5B-A3FFF87215D1}" dt="2024-10-24T14:30:25.742" v="87" actId="20577"/>
+        <pc:sldMkLst>
+          <pc:docMk/>
+          <pc:sldMk cId="3956160510" sldId="263"/>
+        </pc:sldMkLst>
+        <pc:spChg chg="mod">
+          <ac:chgData name="Corey Holton" userId="dfccdeabb580c92e" providerId="LiveId" clId="{644700FA-CD20-461E-AF5B-A3FFF87215D1}" dt="2024-10-24T14:30:25.742" v="87" actId="20577"/>
+          <ac:spMkLst>
+            <pc:docMk/>
+            <pc:sldMk cId="3956160510" sldId="263"/>
+            <ac:spMk id="2" creationId="{8383DBD9-2ED2-92E1-B38C-AEAF34BDE22A}"/>
+          </ac:spMkLst>
+        </pc:spChg>
+        <pc:spChg chg="del">
+          <ac:chgData name="Corey Holton" userId="dfccdeabb580c92e" providerId="LiveId" clId="{644700FA-CD20-461E-AF5B-A3FFF87215D1}" dt="2024-10-24T14:29:57.322" v="56" actId="22"/>
+          <ac:spMkLst>
+            <pc:docMk/>
+            <pc:sldMk cId="3956160510" sldId="263"/>
+            <ac:spMk id="3" creationId="{71E6BC99-EADE-0A14-6B1B-15139C35517F}"/>
+          </ac:spMkLst>
+        </pc:spChg>
+        <pc:picChg chg="add mod ord">
+          <ac:chgData name="Corey Holton" userId="dfccdeabb580c92e" providerId="LiveId" clId="{644700FA-CD20-461E-AF5B-A3FFF87215D1}" dt="2024-10-24T14:29:57.322" v="56" actId="22"/>
+          <ac:picMkLst>
+            <pc:docMk/>
+            <pc:sldMk cId="3956160510" sldId="263"/>
+            <ac:picMk id="5" creationId="{0C98B250-F7EA-D19A-23F1-9FA2AED40A60}"/>
+          </ac:picMkLst>
+        </pc:picChg>
+      </pc:sldChg>
+    </pc:docChg>
+  </pc:docChgLst>
+  <pc:docChgLst>
+    <pc:chgData name="Guest User" providerId="Windows Live" clId="Web-{5BDD9720-0376-4A4B-95A2-4FD6DC09E18D}"/>
+    <pc:docChg chg="addSld modSld sldOrd">
+      <pc:chgData name="Guest User" userId="" providerId="Windows Live" clId="Web-{5BDD9720-0376-4A4B-95A2-4FD6DC09E18D}" dt="2024-10-24T04:22:20.268" v="3" actId="20577"/>
+      <pc:docMkLst>
+        <pc:docMk/>
+      </pc:docMkLst>
+      <pc:sldChg chg="modSp new ord">
+        <pc:chgData name="Guest User" userId="" providerId="Windows Live" clId="Web-{5BDD9720-0376-4A4B-95A2-4FD6DC09E18D}" dt="2024-10-24T04:22:20.268" v="3" actId="20577"/>
+        <pc:sldMkLst>
+          <pc:docMk/>
+          <pc:sldMk cId="4254315922" sldId="262"/>
+        </pc:sldMkLst>
+        <pc:spChg chg="mod">
+          <ac:chgData name="Guest User" userId="" providerId="Windows Live" clId="Web-{5BDD9720-0376-4A4B-95A2-4FD6DC09E18D}" dt="2024-10-24T04:22:14.689" v="2" actId="20577"/>
+          <ac:spMkLst>
+            <pc:docMk/>
+            <pc:sldMk cId="4254315922" sldId="262"/>
+            <ac:spMk id="2" creationId="{01B8FCA9-FAA0-02AA-30CB-56298D431DB4}"/>
+          </ac:spMkLst>
+        </pc:spChg>
+        <pc:spChg chg="mod">
+          <ac:chgData name="Guest User" userId="" providerId="Windows Live" clId="Web-{5BDD9720-0376-4A4B-95A2-4FD6DC09E18D}" dt="2024-10-24T04:22:20.268" v="3" actId="20577"/>
+          <ac:spMkLst>
+            <pc:docMk/>
+            <pc:sldMk cId="4254315922" sldId="262"/>
+            <ac:spMk id="3" creationId="{1D9B6A31-5AEB-E3AD-4193-B769EF866600}"/>
+          </ac:spMkLst>
+        </pc:spChg>
+      </pc:sldChg>
     </pc:docChg>
   </pc:docChgLst>
 </pc:chgInfo>
@@ -308,7 +381,7 @@
           <a:p>
             <a:fld id="{A39D7663-49E6-464A-B1B5-D4B6E2340CA0}" type="datetimeFigureOut">
               <a:rPr lang="en-US" smtClean="0"/>
-              <a:t>10/22/2024</a:t>
+              <a:t>10/24/2024</a:t>
             </a:fld>
             <a:endParaRPr lang="en-US"/>
           </a:p>
@@ -506,7 +579,7 @@
           <a:p>
             <a:fld id="{A39D7663-49E6-464A-B1B5-D4B6E2340CA0}" type="datetimeFigureOut">
               <a:rPr lang="en-US" smtClean="0"/>
-              <a:t>10/22/2024</a:t>
+              <a:t>10/24/2024</a:t>
             </a:fld>
             <a:endParaRPr lang="en-US"/>
           </a:p>
@@ -714,7 +787,7 @@
           <a:p>
             <a:fld id="{A39D7663-49E6-464A-B1B5-D4B6E2340CA0}" type="datetimeFigureOut">
               <a:rPr lang="en-US" smtClean="0"/>
-              <a:t>10/22/2024</a:t>
+              <a:t>10/24/2024</a:t>
             </a:fld>
             <a:endParaRPr lang="en-US"/>
           </a:p>
@@ -912,7 +985,7 @@
           <a:p>
             <a:fld id="{A39D7663-49E6-464A-B1B5-D4B6E2340CA0}" type="datetimeFigureOut">
               <a:rPr lang="en-US" smtClean="0"/>
-              <a:t>10/22/2024</a:t>
+              <a:t>10/24/2024</a:t>
             </a:fld>
             <a:endParaRPr lang="en-US"/>
           </a:p>
@@ -1187,7 +1260,7 @@
           <a:p>
             <a:fld id="{A39D7663-49E6-464A-B1B5-D4B6E2340CA0}" type="datetimeFigureOut">
               <a:rPr lang="en-US" smtClean="0"/>
-              <a:t>10/22/2024</a:t>
+              <a:t>10/24/2024</a:t>
             </a:fld>
             <a:endParaRPr lang="en-US"/>
           </a:p>
@@ -1452,7 +1525,7 @@
           <a:p>
             <a:fld id="{A39D7663-49E6-464A-B1B5-D4B6E2340CA0}" type="datetimeFigureOut">
               <a:rPr lang="en-US" smtClean="0"/>
-              <a:t>10/22/2024</a:t>
+              <a:t>10/24/2024</a:t>
             </a:fld>
             <a:endParaRPr lang="en-US"/>
           </a:p>
@@ -1864,7 +1937,7 @@
           <a:p>
             <a:fld id="{A39D7663-49E6-464A-B1B5-D4B6E2340CA0}" type="datetimeFigureOut">
               <a:rPr lang="en-US" smtClean="0"/>
-              <a:t>10/22/2024</a:t>
+              <a:t>10/24/2024</a:t>
             </a:fld>
             <a:endParaRPr lang="en-US"/>
           </a:p>
@@ -2005,7 +2078,7 @@
           <a:p>
             <a:fld id="{A39D7663-49E6-464A-B1B5-D4B6E2340CA0}" type="datetimeFigureOut">
               <a:rPr lang="en-US" smtClean="0"/>
-              <a:t>10/22/2024</a:t>
+              <a:t>10/24/2024</a:t>
             </a:fld>
             <a:endParaRPr lang="en-US"/>
           </a:p>
@@ -2118,7 +2191,7 @@
           <a:p>
             <a:fld id="{A39D7663-49E6-464A-B1B5-D4B6E2340CA0}" type="datetimeFigureOut">
               <a:rPr lang="en-US" smtClean="0"/>
-              <a:t>10/22/2024</a:t>
+              <a:t>10/24/2024</a:t>
             </a:fld>
             <a:endParaRPr lang="en-US"/>
           </a:p>
@@ -2429,7 +2502,7 @@
           <a:p>
             <a:fld id="{A39D7663-49E6-464A-B1B5-D4B6E2340CA0}" type="datetimeFigureOut">
               <a:rPr lang="en-US" smtClean="0"/>
-              <a:t>10/22/2024</a:t>
+              <a:t>10/24/2024</a:t>
             </a:fld>
             <a:endParaRPr lang="en-US"/>
           </a:p>
@@ -2717,7 +2790,7 @@
           <a:p>
             <a:fld id="{A39D7663-49E6-464A-B1B5-D4B6E2340CA0}" type="datetimeFigureOut">
               <a:rPr lang="en-US" smtClean="0"/>
-              <a:t>10/22/2024</a:t>
+              <a:t>10/24/2024</a:t>
             </a:fld>
             <a:endParaRPr lang="en-US"/>
           </a:p>
@@ -2958,7 +3031,7 @@
           <a:p>
             <a:fld id="{A39D7663-49E6-464A-B1B5-D4B6E2340CA0}" type="datetimeFigureOut">
               <a:rPr lang="en-US" smtClean="0"/>
-              <a:t>10/22/2024</a:t>
+              <a:t>10/24/2024</a:t>
             </a:fld>
             <a:endParaRPr lang="en-US"/>
           </a:p>
@@ -4095,6 +4168,237 @@
     <p:extLst>
       <p:ext uri="{BB962C8B-B14F-4D97-AF65-F5344CB8AC3E}">
         <p14:creationId xmlns:p14="http://schemas.microsoft.com/office/powerpoint/2010/main" val="3060779616"/>
+      </p:ext>
+    </p:extLst>
+  </p:cSld>
+  <p:clrMapOvr>
+    <a:masterClrMapping/>
+  </p:clrMapOvr>
+</p:sld>
+</file>
+
+<file path=ppt/slides/slide6.xml><?xml version="1.0" encoding="utf-8"?>
+<p:sld xmlns:a="http://schemas.openxmlformats.org/drawingml/2006/main" xmlns:r="http://schemas.openxmlformats.org/officeDocument/2006/relationships" xmlns:p="http://schemas.openxmlformats.org/presentationml/2006/main">
+  <p:cSld>
+    <p:spTree>
+      <p:nvGrpSpPr>
+        <p:cNvPr id="1" name=""/>
+        <p:cNvGrpSpPr/>
+        <p:nvPr/>
+      </p:nvGrpSpPr>
+      <p:grpSpPr>
+        <a:xfrm>
+          <a:off x="0" y="0"/>
+          <a:ext cx="0" cy="0"/>
+          <a:chOff x="0" y="0"/>
+          <a:chExt cx="0" cy="0"/>
+        </a:xfrm>
+      </p:grpSpPr>
+      <p:sp>
+        <p:nvSpPr>
+          <p:cNvPr id="2" name="Title 1">
+            <a:extLst>
+              <a:ext uri="{FF2B5EF4-FFF2-40B4-BE49-F238E27FC236}">
+                <a16:creationId xmlns:a16="http://schemas.microsoft.com/office/drawing/2014/main" id="{8383DBD9-2ED2-92E1-B38C-AEAF34BDE22A}"/>
+              </a:ext>
+            </a:extLst>
+          </p:cNvPr>
+          <p:cNvSpPr>
+            <a:spLocks noGrp="1"/>
+          </p:cNvSpPr>
+          <p:nvPr>
+            <p:ph type="title"/>
+          </p:nvPr>
+        </p:nvSpPr>
+        <p:spPr/>
+        <p:txBody>
+          <a:bodyPr/>
+          <a:lstStyle/>
+          <a:p>
+            <a:r>
+              <a:rPr lang="en-US" dirty="0"/>
+              <a:t>KNN Regression 1</a:t>
+            </a:r>
+            <a:r>
+              <a:rPr lang="en-US" baseline="30000" dirty="0"/>
+              <a:t>st</a:t>
+            </a:r>
+            <a:r>
+              <a:rPr lang="en-US" dirty="0"/>
+              <a:t> attempt</a:t>
+            </a:r>
+          </a:p>
+        </p:txBody>
+      </p:sp>
+      <p:pic>
+        <p:nvPicPr>
+          <p:cNvPr id="5" name="Content Placeholder 4">
+            <a:extLst>
+              <a:ext uri="{FF2B5EF4-FFF2-40B4-BE49-F238E27FC236}">
+                <a16:creationId xmlns:a16="http://schemas.microsoft.com/office/drawing/2014/main" id="{0C98B250-F7EA-D19A-23F1-9FA2AED40A60}"/>
+              </a:ext>
+            </a:extLst>
+          </p:cNvPr>
+          <p:cNvPicPr>
+            <a:picLocks noGrp="1" noChangeAspect="1"/>
+          </p:cNvPicPr>
+          <p:nvPr>
+            <p:ph idx="1"/>
+          </p:nvPr>
+        </p:nvPicPr>
+        <p:blipFill>
+          <a:blip r:embed="rId2"/>
+          <a:stretch>
+            <a:fillRect/>
+          </a:stretch>
+        </p:blipFill>
+        <p:spPr>
+          <a:xfrm>
+            <a:off x="3104455" y="1825625"/>
+            <a:ext cx="5983090" cy="4351338"/>
+          </a:xfrm>
+        </p:spPr>
+      </p:pic>
+    </p:spTree>
+    <p:extLst>
+      <p:ext uri="{BB962C8B-B14F-4D97-AF65-F5344CB8AC3E}">
+        <p14:creationId xmlns:p14="http://schemas.microsoft.com/office/powerpoint/2010/main" val="3956160510"/>
+      </p:ext>
+    </p:extLst>
+  </p:cSld>
+  <p:clrMapOvr>
+    <a:masterClrMapping/>
+  </p:clrMapOvr>
+</p:sld>
+</file>
+
+<file path=ppt/slides/slide7.xml><?xml version="1.0" encoding="utf-8"?>
+<p:sld xmlns:a="http://schemas.openxmlformats.org/drawingml/2006/main" xmlns:r="http://schemas.openxmlformats.org/officeDocument/2006/relationships" xmlns:p="http://schemas.openxmlformats.org/presentationml/2006/main">
+  <p:cSld>
+    <p:spTree>
+      <p:nvGrpSpPr>
+        <p:cNvPr id="1" name=""/>
+        <p:cNvGrpSpPr/>
+        <p:nvPr/>
+      </p:nvGrpSpPr>
+      <p:grpSpPr>
+        <a:xfrm>
+          <a:off x="0" y="0"/>
+          <a:ext cx="0" cy="0"/>
+          <a:chOff x="0" y="0"/>
+          <a:chExt cx="0" cy="0"/>
+        </a:xfrm>
+      </p:grpSpPr>
+      <p:sp>
+        <p:nvSpPr>
+          <p:cNvPr id="2" name="Title 1">
+            <a:extLst>
+              <a:ext uri="{FF2B5EF4-FFF2-40B4-BE49-F238E27FC236}">
+                <a16:creationId xmlns:a16="http://schemas.microsoft.com/office/drawing/2014/main" id="{01B8FCA9-FAA0-02AA-30CB-56298D431DB4}"/>
+              </a:ext>
+            </a:extLst>
+          </p:cNvPr>
+          <p:cNvSpPr>
+            <a:spLocks noGrp="1"/>
+          </p:cNvSpPr>
+          <p:nvPr>
+            <p:ph type="title"/>
+          </p:nvPr>
+        </p:nvSpPr>
+        <p:spPr/>
+        <p:txBody>
+          <a:bodyPr/>
+          <a:lstStyle/>
+          <a:p>
+            <a:r>
+              <a:rPr lang="en-US" dirty="0">
+                <a:ea typeface="+mj-lt"/>
+                <a:cs typeface="+mj-lt"/>
+              </a:rPr>
+              <a:t>Advantage of Large Dataset</a:t>
+            </a:r>
+            <a:endParaRPr lang="en-US" dirty="0"/>
+          </a:p>
+        </p:txBody>
+      </p:sp>
+      <p:sp>
+        <p:nvSpPr>
+          <p:cNvPr id="3" name="Content Placeholder 2">
+            <a:extLst>
+              <a:ext uri="{FF2B5EF4-FFF2-40B4-BE49-F238E27FC236}">
+                <a16:creationId xmlns:a16="http://schemas.microsoft.com/office/drawing/2014/main" id="{1D9B6A31-5AEB-E3AD-4193-B769EF866600}"/>
+              </a:ext>
+            </a:extLst>
+          </p:cNvPr>
+          <p:cNvSpPr>
+            <a:spLocks noGrp="1"/>
+          </p:cNvSpPr>
+          <p:nvPr>
+            <p:ph idx="1"/>
+          </p:nvPr>
+        </p:nvSpPr>
+        <p:spPr/>
+        <p:txBody>
+          <a:bodyPr vert="horz" lIns="91440" tIns="45720" rIns="91440" bIns="45720" rtlCol="0" anchor="t">
+            <a:normAutofit/>
+          </a:bodyPr>
+          <a:lstStyle/>
+          <a:p>
+            <a:r>
+              <a:rPr lang="en-US">
+                <a:ea typeface="+mn-lt"/>
+                <a:cs typeface="+mn-lt"/>
+              </a:rPr>
+              <a:t>More historical data allows for better trend analysis. </a:t>
+            </a:r>
+            <a:endParaRPr lang="en-US"/>
+          </a:p>
+          <a:p>
+            <a:r>
+              <a:rPr lang="en-US">
+                <a:ea typeface="+mn-lt"/>
+                <a:cs typeface="+mn-lt"/>
+              </a:rPr>
+              <a:t>Identify patterns, price movement, and seasonality.</a:t>
+            </a:r>
+            <a:endParaRPr lang="en-US"/>
+          </a:p>
+          <a:p>
+            <a:r>
+              <a:rPr lang="en-US">
+                <a:ea typeface="+mn-lt"/>
+                <a:cs typeface="+mn-lt"/>
+              </a:rPr>
+              <a:t>Enhanced Statistical Significance </a:t>
+            </a:r>
+            <a:endParaRPr lang="en-US"/>
+          </a:p>
+          <a:p>
+            <a:r>
+              <a:rPr lang="en-US">
+                <a:ea typeface="+mn-lt"/>
+                <a:cs typeface="+mn-lt"/>
+              </a:rPr>
+              <a:t>Confidence in your findings</a:t>
+            </a:r>
+            <a:endParaRPr lang="en-US"/>
+          </a:p>
+          <a:p>
+            <a:r>
+              <a:rPr lang="en-US">
+                <a:ea typeface="+mn-lt"/>
+                <a:cs typeface="+mn-lt"/>
+              </a:rPr>
+              <a:t>Allows for regression analysis, moving averages, and ML algorithms to future forecast returns.</a:t>
+            </a:r>
+            <a:endParaRPr lang="en-US"/>
+          </a:p>
+        </p:txBody>
+      </p:sp>
+    </p:spTree>
+    <p:extLst>
+      <p:ext uri="{BB962C8B-B14F-4D97-AF65-F5344CB8AC3E}">
+        <p14:creationId xmlns:p14="http://schemas.microsoft.com/office/powerpoint/2010/main" val="4254315922"/>
       </p:ext>
     </p:extLst>
   </p:cSld>

</xml_diff>